<commit_message>
Updated About Me PP
</commit_message>
<xml_diff>
--- a/images/AboutMe.pptx
+++ b/images/AboutMe.pptx
@@ -1397,7 +1397,7 @@
           <a:p>
             <a:fld id="{BC1C655F-54C7-4D03-AD26-E0C40F01563A}" type="datetimeFigureOut">
               <a:rPr lang="id-ID" smtClean="0"/>
-              <a:t>20/04/2020</a:t>
+              <a:t>23/02/2021</a:t>
             </a:fld>
             <a:endParaRPr lang="id-ID"/>
           </a:p>
@@ -1796,7 +1796,7 @@
           <a:p>
             <a:fld id="{14F96FE2-9E77-4834-9C6B-212E1056298F}" type="datetimeFigureOut">
               <a:rPr lang="en-US" smtClean="0"/>
-              <a:t>4/20/2020</a:t>
+              <a:t>2/23/2021</a:t>
             </a:fld>
             <a:endParaRPr lang="en-US" dirty="0"/>
           </a:p>
@@ -2053,7 +2053,7 @@
           <a:p>
             <a:fld id="{14F96FE2-9E77-4834-9C6B-212E1056298F}" type="datetimeFigureOut">
               <a:rPr lang="en-US" smtClean="0"/>
-              <a:t>4/20/2020</a:t>
+              <a:t>2/23/2021</a:t>
             </a:fld>
             <a:endParaRPr lang="en-US" dirty="0"/>
           </a:p>
@@ -2223,7 +2223,7 @@
           <a:p>
             <a:fld id="{14F96FE2-9E77-4834-9C6B-212E1056298F}" type="datetimeFigureOut">
               <a:rPr lang="en-US" smtClean="0"/>
-              <a:t>4/20/2020</a:t>
+              <a:t>2/23/2021</a:t>
             </a:fld>
             <a:endParaRPr lang="en-US" dirty="0"/>
           </a:p>
@@ -2403,7 +2403,7 @@
           <a:p>
             <a:fld id="{14F96FE2-9E77-4834-9C6B-212E1056298F}" type="datetimeFigureOut">
               <a:rPr lang="en-US" smtClean="0"/>
-              <a:t>4/20/2020</a:t>
+              <a:t>2/23/2021</a:t>
             </a:fld>
             <a:endParaRPr lang="en-US" dirty="0"/>
           </a:p>
@@ -2573,7 +2573,7 @@
           <a:p>
             <a:fld id="{14F96FE2-9E77-4834-9C6B-212E1056298F}" type="datetimeFigureOut">
               <a:rPr lang="en-US" smtClean="0"/>
-              <a:t>4/20/2020</a:t>
+              <a:t>2/23/2021</a:t>
             </a:fld>
             <a:endParaRPr lang="en-US" dirty="0"/>
           </a:p>
@@ -2819,7 +2819,7 @@
           <a:p>
             <a:fld id="{14F96FE2-9E77-4834-9C6B-212E1056298F}" type="datetimeFigureOut">
               <a:rPr lang="en-US" smtClean="0"/>
-              <a:t>4/20/2020</a:t>
+              <a:t>2/23/2021</a:t>
             </a:fld>
             <a:endParaRPr lang="en-US" dirty="0"/>
           </a:p>
@@ -3051,7 +3051,7 @@
           <a:p>
             <a:fld id="{14F96FE2-9E77-4834-9C6B-212E1056298F}" type="datetimeFigureOut">
               <a:rPr lang="en-US" smtClean="0"/>
-              <a:t>4/20/2020</a:t>
+              <a:t>2/23/2021</a:t>
             </a:fld>
             <a:endParaRPr lang="en-US" dirty="0"/>
           </a:p>
@@ -3418,7 +3418,7 @@
           <a:p>
             <a:fld id="{14F96FE2-9E77-4834-9C6B-212E1056298F}" type="datetimeFigureOut">
               <a:rPr lang="en-US" smtClean="0"/>
-              <a:t>4/20/2020</a:t>
+              <a:t>2/23/2021</a:t>
             </a:fld>
             <a:endParaRPr lang="en-US" dirty="0"/>
           </a:p>
@@ -3536,7 +3536,7 @@
           <a:p>
             <a:fld id="{14F96FE2-9E77-4834-9C6B-212E1056298F}" type="datetimeFigureOut">
               <a:rPr lang="en-US" smtClean="0"/>
-              <a:t>4/20/2020</a:t>
+              <a:t>2/23/2021</a:t>
             </a:fld>
             <a:endParaRPr lang="en-US" dirty="0"/>
           </a:p>
@@ -3631,7 +3631,7 @@
           <a:p>
             <a:fld id="{14F96FE2-9E77-4834-9C6B-212E1056298F}" type="datetimeFigureOut">
               <a:rPr lang="en-US" smtClean="0"/>
-              <a:t>4/20/2020</a:t>
+              <a:t>2/23/2021</a:t>
             </a:fld>
             <a:endParaRPr lang="en-US" dirty="0"/>
           </a:p>
@@ -3714,7 +3714,7 @@
           <p:cNvPr id="8" name="Picture Placeholder 7">
             <a:extLst>
               <a:ext uri="{FF2B5EF4-FFF2-40B4-BE49-F238E27FC236}">
-                <a16:creationId xmlns:a16="http://schemas.microsoft.com/office/drawing/2014/main" xmlns="" id="{23B832CC-E04A-47A7-966D-475AEA6409AB}"/>
+                <a16:creationId xmlns="" xmlns:a16="http://schemas.microsoft.com/office/drawing/2014/main" id="{23B832CC-E04A-47A7-966D-475AEA6409AB}"/>
               </a:ext>
             </a:extLst>
           </p:cNvPr>
@@ -3934,7 +3934,7 @@
           <a:p>
             <a:fld id="{14F96FE2-9E77-4834-9C6B-212E1056298F}" type="datetimeFigureOut">
               <a:rPr lang="en-US" smtClean="0"/>
-              <a:t>4/20/2020</a:t>
+              <a:t>2/23/2021</a:t>
             </a:fld>
             <a:endParaRPr lang="en-US" dirty="0"/>
           </a:p>
@@ -3987,7 +3987,7 @@
           <p:cNvPr id="6" name="Freeform: Shape 7">
             <a:extLst>
               <a:ext uri="{FF2B5EF4-FFF2-40B4-BE49-F238E27FC236}">
-                <a16:creationId xmlns:a16="http://schemas.microsoft.com/office/drawing/2014/main" xmlns="" id="{23B832CC-E04A-47A7-966D-475AEA6409AB}"/>
+                <a16:creationId xmlns="" xmlns:a16="http://schemas.microsoft.com/office/drawing/2014/main" id="{23B832CC-E04A-47A7-966D-475AEA6409AB}"/>
               </a:ext>
             </a:extLst>
           </p:cNvPr>
@@ -4195,7 +4195,7 @@
           <p:cNvPr id="7" name="Freeform: Shape 7">
             <a:extLst>
               <a:ext uri="{FF2B5EF4-FFF2-40B4-BE49-F238E27FC236}">
-                <a16:creationId xmlns:a16="http://schemas.microsoft.com/office/drawing/2014/main" xmlns="" id="{23B832CC-E04A-47A7-966D-475AEA6409AB}"/>
+                <a16:creationId xmlns="" xmlns:a16="http://schemas.microsoft.com/office/drawing/2014/main" id="{23B832CC-E04A-47A7-966D-475AEA6409AB}"/>
               </a:ext>
             </a:extLst>
           </p:cNvPr>
@@ -4627,7 +4627,7 @@
           <a:p>
             <a:fld id="{14F96FE2-9E77-4834-9C6B-212E1056298F}" type="datetimeFigureOut">
               <a:rPr lang="en-US" smtClean="0"/>
-              <a:t>4/20/2020</a:t>
+              <a:t>2/23/2021</a:t>
             </a:fld>
             <a:endParaRPr lang="en-US" dirty="0"/>
           </a:p>
@@ -4840,7 +4840,7 @@
           <a:p>
             <a:fld id="{14F96FE2-9E77-4834-9C6B-212E1056298F}" type="datetimeFigureOut">
               <a:rPr lang="en-US" smtClean="0"/>
-              <a:t>4/20/2020</a:t>
+              <a:t>2/23/2021</a:t>
             </a:fld>
             <a:endParaRPr lang="en-US" dirty="0"/>
           </a:p>
@@ -5332,7 +5332,7 @@
           <p:cNvPr id="19" name="Rectangle 18">
             <a:extLst>
               <a:ext uri="{C183D7F6-B498-43B3-948B-1728B52AA6E4}">
-                <adec:decorative xmlns:adec="http://schemas.microsoft.com/office/drawing/2017/decorative" xmlns="" val="1"/>
+                <adec:decorative xmlns="" xmlns:adec="http://schemas.microsoft.com/office/drawing/2017/decorative" val="1"/>
               </a:ext>
             </a:extLst>
           </p:cNvPr>
@@ -5471,7 +5471,7 @@
           <p:cNvPr id="3" name="Title 2" hidden="1">
             <a:extLst>
               <a:ext uri="{FF2B5EF4-FFF2-40B4-BE49-F238E27FC236}">
-                <a16:creationId xmlns:a16="http://schemas.microsoft.com/office/drawing/2014/main" xmlns="" id="{80AA5C56-EC57-4914-8118-68854697E0F3}"/>
+                <a16:creationId xmlns="" xmlns:a16="http://schemas.microsoft.com/office/drawing/2014/main" id="{80AA5C56-EC57-4914-8118-68854697E0F3}"/>
               </a:ext>
             </a:extLst>
           </p:cNvPr>
@@ -5574,7 +5574,7 @@
           <p:cNvPr id="6" name="Picture 5">
             <a:extLst>
               <a:ext uri="{C183D7F6-B498-43B3-948B-1728B52AA6E4}">
-                <adec:decorative xmlns:adec="http://schemas.microsoft.com/office/drawing/2017/decorative" xmlns="" val="1"/>
+                <adec:decorative xmlns="" xmlns:adec="http://schemas.microsoft.com/office/drawing/2017/decorative" val="1"/>
               </a:ext>
             </a:extLst>
           </p:cNvPr>
@@ -5663,7 +5663,7 @@
           <p:cNvPr id="5" name="Rectangle 4">
             <a:extLst>
               <a:ext uri="{C183D7F6-B498-43B3-948B-1728B52AA6E4}">
-                <adec:decorative xmlns:adec="http://schemas.microsoft.com/office/drawing/2017/decorative" xmlns="" val="1"/>
+                <adec:decorative xmlns="" xmlns:adec="http://schemas.microsoft.com/office/drawing/2017/decorative" val="1"/>
               </a:ext>
             </a:extLst>
           </p:cNvPr>
@@ -5672,7 +5672,7 @@
         </p:nvSpPr>
         <p:spPr>
           <a:xfrm>
-            <a:off x="953" y="-81420"/>
+            <a:off x="953" y="-3426"/>
             <a:ext cx="12192000" cy="6939420"/>
           </a:xfrm>
           <a:prstGeom prst="rect">
@@ -5729,7 +5729,7 @@
           <p:cNvPr id="21" name="Group 20">
             <a:extLst>
               <a:ext uri="{C183D7F6-B498-43B3-948B-1728B52AA6E4}">
-                <adec:decorative xmlns:adec="http://schemas.microsoft.com/office/drawing/2017/decorative" xmlns="" val="1"/>
+                <adec:decorative xmlns="" xmlns:adec="http://schemas.microsoft.com/office/drawing/2017/decorative" val="1"/>
               </a:ext>
             </a:extLst>
           </p:cNvPr>
@@ -5888,7 +5888,7 @@
           <p:cNvPr id="2" name="Title 1" hidden="1">
             <a:extLst>
               <a:ext uri="{FF2B5EF4-FFF2-40B4-BE49-F238E27FC236}">
-                <a16:creationId xmlns:a16="http://schemas.microsoft.com/office/drawing/2014/main" xmlns="" id="{10E603A3-B905-4FE4-AF3D-7ABD07598BAD}"/>
+                <a16:creationId xmlns="" xmlns:a16="http://schemas.microsoft.com/office/drawing/2014/main" id="{10E603A3-B905-4FE4-AF3D-7ABD07598BAD}"/>
               </a:ext>
             </a:extLst>
           </p:cNvPr>
@@ -5989,8 +5989,8 @@
         </p:nvSpPr>
         <p:spPr>
           <a:xfrm>
-            <a:off x="4682173" y="2848872"/>
-            <a:ext cx="2901756" cy="523220"/>
+            <a:off x="5346435" y="2865070"/>
+            <a:ext cx="1499128" cy="523220"/>
           </a:xfrm>
           <a:prstGeom prst="rect">
             <a:avLst/>
@@ -6019,7 +6019,7 @@
                   </a:outerShdw>
                 </a:effectLst>
               </a:rPr>
-              <a:t>Functional Analyst</a:t>
+              <a:t>Analytics</a:t>
             </a:r>
             <a:endParaRPr lang="en-US" sz="2800" b="1" dirty="0">
               <a:ln w="0"/>
@@ -6142,7 +6142,7 @@
           <p:cNvPr id="6" name="Picture 5">
             <a:extLst>
               <a:ext uri="{C183D7F6-B498-43B3-948B-1728B52AA6E4}">
-                <adec:decorative xmlns:adec="http://schemas.microsoft.com/office/drawing/2017/decorative" xmlns="" val="1"/>
+                <adec:decorative xmlns="" xmlns:adec="http://schemas.microsoft.com/office/drawing/2017/decorative" val="1"/>
               </a:ext>
             </a:extLst>
           </p:cNvPr>
@@ -6231,7 +6231,7 @@
           <p:cNvPr id="5" name="Rectangle 4">
             <a:extLst>
               <a:ext uri="{C183D7F6-B498-43B3-948B-1728B52AA6E4}">
-                <adec:decorative xmlns:adec="http://schemas.microsoft.com/office/drawing/2017/decorative" xmlns="" val="1"/>
+                <adec:decorative xmlns="" xmlns:adec="http://schemas.microsoft.com/office/drawing/2017/decorative" val="1"/>
               </a:ext>
             </a:extLst>
           </p:cNvPr>
@@ -6240,7 +6240,7 @@
         </p:nvSpPr>
         <p:spPr>
           <a:xfrm>
-            <a:off x="953" y="-81420"/>
+            <a:off x="-954" y="-81420"/>
             <a:ext cx="12192000" cy="6939420"/>
           </a:xfrm>
           <a:prstGeom prst="rect">
@@ -6297,7 +6297,7 @@
           <p:cNvPr id="2" name="Title 1" hidden="1">
             <a:extLst>
               <a:ext uri="{FF2B5EF4-FFF2-40B4-BE49-F238E27FC236}">
-                <a16:creationId xmlns:a16="http://schemas.microsoft.com/office/drawing/2014/main" xmlns="" id="{10E603A3-B905-4FE4-AF3D-7ABD07598BAD}"/>
+                <a16:creationId xmlns="" xmlns:a16="http://schemas.microsoft.com/office/drawing/2014/main" id="{10E603A3-B905-4FE4-AF3D-7ABD07598BAD}"/>
               </a:ext>
             </a:extLst>
           </p:cNvPr>
@@ -6362,11 +6362,14 @@
               <a:buChar char="•"/>
             </a:pPr>
             <a:r>
-              <a:rPr lang="en-US" sz="3200" b="1" dirty="0">
+              <a:rPr lang="en-US" sz="3200" b="1" dirty="0" smtClean="0">
                 <a:cs typeface="Andalus" panose="02020603050405020304" pitchFamily="18" charset="-78"/>
               </a:rPr>
-              <a:t>Finance</a:t>
-            </a:r>
+              <a:t>Finance/Analytics</a:t>
+            </a:r>
+            <a:endParaRPr lang="en-US" sz="3200" b="1" dirty="0">
+              <a:cs typeface="Andalus" panose="02020603050405020304" pitchFamily="18" charset="-78"/>
+            </a:endParaRPr>
           </a:p>
           <a:p>
             <a:pPr marL="342900" indent="-342900">
@@ -6952,7 +6955,7 @@
           <p:cNvPr id="6" name="Picture 5">
             <a:extLst>
               <a:ext uri="{C183D7F6-B498-43B3-948B-1728B52AA6E4}">
-                <adec:decorative xmlns:adec="http://schemas.microsoft.com/office/drawing/2017/decorative" xmlns="" val="1"/>
+                <adec:decorative xmlns="" xmlns:adec="http://schemas.microsoft.com/office/drawing/2017/decorative" val="1"/>
               </a:ext>
             </a:extLst>
           </p:cNvPr>
@@ -7041,7 +7044,7 @@
           <p:cNvPr id="5" name="Rectangle 4">
             <a:extLst>
               <a:ext uri="{C183D7F6-B498-43B3-948B-1728B52AA6E4}">
-                <adec:decorative xmlns:adec="http://schemas.microsoft.com/office/drawing/2017/decorative" xmlns="" val="1"/>
+                <adec:decorative xmlns="" xmlns:adec="http://schemas.microsoft.com/office/drawing/2017/decorative" val="1"/>
               </a:ext>
             </a:extLst>
           </p:cNvPr>
@@ -7107,7 +7110,7 @@
           <p:cNvPr id="2" name="Title 1" hidden="1">
             <a:extLst>
               <a:ext uri="{FF2B5EF4-FFF2-40B4-BE49-F238E27FC236}">
-                <a16:creationId xmlns:a16="http://schemas.microsoft.com/office/drawing/2014/main" xmlns="" id="{10E603A3-B905-4FE4-AF3D-7ABD07598BAD}"/>
+                <a16:creationId xmlns="" xmlns:a16="http://schemas.microsoft.com/office/drawing/2014/main" id="{10E603A3-B905-4FE4-AF3D-7ABD07598BAD}"/>
               </a:ext>
             </a:extLst>
           </p:cNvPr>
@@ -7135,7 +7138,7 @@
           <p:cNvPr id="7" name="Title 1">
             <a:extLst>
               <a:ext uri="{FF2B5EF4-FFF2-40B4-BE49-F238E27FC236}">
-                <a16:creationId xmlns="" xmlns:a16="http://schemas.microsoft.com/office/drawing/2014/main" id="{0558B61B-BB92-4768-AFBB-C2D3F20842D6}"/>
+                <a16:creationId xmlns:a16="http://schemas.microsoft.com/office/drawing/2014/main" xmlns="" id="{0558B61B-BB92-4768-AFBB-C2D3F20842D6}"/>
               </a:ext>
             </a:extLst>
           </p:cNvPr>
@@ -7200,7 +7203,7 @@
           <p:cNvPr id="8" name="Footer Placeholder 2">
             <a:extLst>
               <a:ext uri="{FF2B5EF4-FFF2-40B4-BE49-F238E27FC236}">
-                <a16:creationId xmlns="" xmlns:a16="http://schemas.microsoft.com/office/drawing/2014/main" id="{0DEFF9E6-E51F-41E6-AD19-8FF84549AB3E}"/>
+                <a16:creationId xmlns:a16="http://schemas.microsoft.com/office/drawing/2014/main" xmlns="" id="{0DEFF9E6-E51F-41E6-AD19-8FF84549AB3E}"/>
               </a:ext>
             </a:extLst>
           </p:cNvPr>
@@ -7234,7 +7237,7 @@
           <p:cNvPr id="12" name="Chart 11">
             <a:extLst>
               <a:ext uri="{FF2B5EF4-FFF2-40B4-BE49-F238E27FC236}">
-                <a16:creationId xmlns="" xmlns:a16="http://schemas.microsoft.com/office/drawing/2014/main" id="{E66CA3D8-2C78-46B3-B39E-61C3B1570440}"/>
+                <a16:creationId xmlns:a16="http://schemas.microsoft.com/office/drawing/2014/main" xmlns="" id="{E66CA3D8-2C78-46B3-B39E-61C3B1570440}"/>
               </a:ext>
             </a:extLst>
           </p:cNvPr>
@@ -7262,7 +7265,7 @@
           <p:cNvPr id="13" name="Rectangle 12">
             <a:extLst>
               <a:ext uri="{FF2B5EF4-FFF2-40B4-BE49-F238E27FC236}">
-                <a16:creationId xmlns="" xmlns:a16="http://schemas.microsoft.com/office/drawing/2014/main" id="{59558963-A249-4EED-94EF-6C0741E91F31}"/>
+                <a16:creationId xmlns:a16="http://schemas.microsoft.com/office/drawing/2014/main" xmlns="" id="{59558963-A249-4EED-94EF-6C0741E91F31}"/>
               </a:ext>
             </a:extLst>
           </p:cNvPr>
@@ -7314,7 +7317,7 @@
           <p:cNvPr id="14" name="TextBox 47">
             <a:extLst>
               <a:ext uri="{FF2B5EF4-FFF2-40B4-BE49-F238E27FC236}">
-                <a16:creationId xmlns="" xmlns:a16="http://schemas.microsoft.com/office/drawing/2014/main" id="{2D80A1D2-265F-448F-A52C-92EA682624B2}"/>
+                <a16:creationId xmlns:a16="http://schemas.microsoft.com/office/drawing/2014/main" xmlns="" id="{2D80A1D2-265F-448F-A52C-92EA682624B2}"/>
               </a:ext>
             </a:extLst>
           </p:cNvPr>
@@ -7323,8 +7326,8 @@
         </p:nvSpPr>
         <p:spPr>
           <a:xfrm>
-            <a:off x="9231878" y="637946"/>
-            <a:ext cx="2693422" cy="2708434"/>
+            <a:off x="9231878" y="868779"/>
+            <a:ext cx="2693422" cy="2246769"/>
           </a:xfrm>
           <a:prstGeom prst="rect">
             <a:avLst/>
@@ -7436,10 +7439,13 @@
           </a:lstStyle>
           <a:p>
             <a:pPr marL="342900" indent="-342900">
+              <a:spcBef>
+                <a:spcPts val="600"/>
+              </a:spcBef>
               <a:buAutoNum type="arabicPeriod"/>
             </a:pPr>
             <a:r>
-              <a:rPr lang="en-US" sz="1600" b="1" dirty="0" smtClean="0">
+              <a:rPr lang="en-US" sz="1400" b="1" dirty="0" smtClean="0">
                 <a:solidFill>
                   <a:schemeClr val="tx1">
                     <a:lumMod val="75000"/>
@@ -7452,10 +7458,13 @@
           </a:p>
           <a:p>
             <a:pPr marL="342900" indent="-342900">
+              <a:spcBef>
+                <a:spcPts val="600"/>
+              </a:spcBef>
               <a:buAutoNum type="arabicPeriod"/>
             </a:pPr>
             <a:r>
-              <a:rPr lang="en-US" sz="1600" b="1" dirty="0" smtClean="0">
+              <a:rPr lang="en-US" sz="1400" b="1" dirty="0" smtClean="0">
                 <a:solidFill>
                   <a:schemeClr val="tx1">
                     <a:lumMod val="75000"/>
@@ -7468,10 +7477,13 @@
           </a:p>
           <a:p>
             <a:pPr marL="342900" indent="-342900">
+              <a:spcBef>
+                <a:spcPts val="600"/>
+              </a:spcBef>
               <a:buAutoNum type="arabicPeriod"/>
             </a:pPr>
             <a:r>
-              <a:rPr lang="en-US" sz="1600" b="1" dirty="0" smtClean="0">
+              <a:rPr lang="en-US" sz="1400" b="1" dirty="0" smtClean="0">
                 <a:solidFill>
                   <a:schemeClr val="tx1">
                     <a:lumMod val="75000"/>
@@ -7484,10 +7496,13 @@
           </a:p>
           <a:p>
             <a:pPr marL="342900" indent="-342900">
+              <a:spcBef>
+                <a:spcPts val="600"/>
+              </a:spcBef>
               <a:buAutoNum type="arabicPeriod"/>
             </a:pPr>
             <a:r>
-              <a:rPr lang="en-US" sz="1600" b="1" dirty="0" smtClean="0">
+              <a:rPr lang="en-US" sz="1400" b="1" dirty="0" smtClean="0">
                 <a:solidFill>
                   <a:schemeClr val="tx1">
                     <a:lumMod val="75000"/>
@@ -7500,10 +7515,13 @@
           </a:p>
           <a:p>
             <a:pPr marL="342900" indent="-342900">
+              <a:spcBef>
+                <a:spcPts val="600"/>
+              </a:spcBef>
               <a:buAutoNum type="arabicPeriod"/>
             </a:pPr>
             <a:r>
-              <a:rPr lang="en-US" sz="1600" b="1" dirty="0" smtClean="0">
+              <a:rPr lang="en-US" sz="1400" b="1" dirty="0" smtClean="0">
                 <a:solidFill>
                   <a:schemeClr val="tx1">
                     <a:lumMod val="75000"/>
@@ -7513,7 +7531,7 @@
               </a:rPr>
               <a:t>Reconciliation data during new software implementation and software change</a:t>
             </a:r>
-            <a:endParaRPr lang="en-US" sz="1600" b="1" dirty="0">
+            <a:endParaRPr lang="en-US" sz="1400" b="1" dirty="0">
               <a:solidFill>
                 <a:schemeClr val="tx1">
                   <a:lumMod val="75000"/>
@@ -7529,7 +7547,7 @@
           <p:cNvPr id="15" name="Rectangle 14">
             <a:extLst>
               <a:ext uri="{FF2B5EF4-FFF2-40B4-BE49-F238E27FC236}">
-                <a16:creationId xmlns="" xmlns:a16="http://schemas.microsoft.com/office/drawing/2014/main" id="{C34FFC4B-C0FD-40B7-84F6-1581A1DBE100}"/>
+                <a16:creationId xmlns:a16="http://schemas.microsoft.com/office/drawing/2014/main" xmlns="" id="{C34FFC4B-C0FD-40B7-84F6-1581A1DBE100}"/>
               </a:ext>
             </a:extLst>
           </p:cNvPr>
@@ -7581,7 +7599,7 @@
           <p:cNvPr id="16" name="Rectangle 15">
             <a:extLst>
               <a:ext uri="{FF2B5EF4-FFF2-40B4-BE49-F238E27FC236}">
-                <a16:creationId xmlns="" xmlns:a16="http://schemas.microsoft.com/office/drawing/2014/main" id="{36DF1C4B-6BC2-4B51-8433-E3F48420959A}"/>
+                <a16:creationId xmlns:a16="http://schemas.microsoft.com/office/drawing/2014/main" xmlns="" id="{36DF1C4B-6BC2-4B51-8433-E3F48420959A}"/>
               </a:ext>
             </a:extLst>
           </p:cNvPr>
@@ -7633,7 +7651,7 @@
           <p:cNvPr id="17" name="TextBox 47">
             <a:extLst>
               <a:ext uri="{FF2B5EF4-FFF2-40B4-BE49-F238E27FC236}">
-                <a16:creationId xmlns="" xmlns:a16="http://schemas.microsoft.com/office/drawing/2014/main" id="{37C247B4-175D-4D11-B853-D2AF3DE04EB3}"/>
+                <a16:creationId xmlns:a16="http://schemas.microsoft.com/office/drawing/2014/main" xmlns="" id="{37C247B4-175D-4D11-B853-D2AF3DE04EB3}"/>
               </a:ext>
             </a:extLst>
           </p:cNvPr>
@@ -7642,8 +7660,8 @@
         </p:nvSpPr>
         <p:spPr>
           <a:xfrm flipH="1">
-            <a:off x="346081" y="1161165"/>
-            <a:ext cx="2693422" cy="1446550"/>
+            <a:off x="346081" y="1245321"/>
+            <a:ext cx="2693422" cy="1308050"/>
           </a:xfrm>
           <a:prstGeom prst="rect">
             <a:avLst/>
@@ -7755,10 +7773,13 @@
           </a:lstStyle>
           <a:p>
             <a:pPr marL="342900" indent="-342900">
+              <a:spcBef>
+                <a:spcPts val="600"/>
+              </a:spcBef>
               <a:buAutoNum type="arabicPeriod"/>
             </a:pPr>
             <a:r>
-              <a:rPr lang="en-US" sz="1600" b="1" dirty="0" smtClean="0">
+              <a:rPr lang="en-US" sz="1400" b="1" dirty="0" smtClean="0">
                 <a:solidFill>
                   <a:schemeClr val="tx1">
                     <a:lumMod val="75000"/>
@@ -7771,10 +7792,13 @@
           </a:p>
           <a:p>
             <a:pPr marL="342900" indent="-342900">
+              <a:spcBef>
+                <a:spcPts val="600"/>
+              </a:spcBef>
               <a:buAutoNum type="arabicPeriod"/>
             </a:pPr>
             <a:r>
-              <a:rPr lang="en-US" sz="1600" b="1" dirty="0" smtClean="0">
+              <a:rPr lang="en-US" sz="1400" b="1" dirty="0" smtClean="0">
                 <a:solidFill>
                   <a:schemeClr val="tx1">
                     <a:lumMod val="75000"/>
@@ -7787,10 +7811,13 @@
           </a:p>
           <a:p>
             <a:pPr marL="342900" indent="-342900">
+              <a:spcBef>
+                <a:spcPts val="600"/>
+              </a:spcBef>
               <a:buAutoNum type="arabicPeriod"/>
             </a:pPr>
             <a:r>
-              <a:rPr lang="en-US" sz="1600" b="1" dirty="0" smtClean="0">
+              <a:rPr lang="en-US" sz="1400" b="1" dirty="0" smtClean="0">
                 <a:solidFill>
                   <a:schemeClr val="tx1">
                     <a:lumMod val="75000"/>
@@ -7803,10 +7830,13 @@
           </a:p>
           <a:p>
             <a:pPr marL="342900" indent="-342900">
+              <a:spcBef>
+                <a:spcPts val="600"/>
+              </a:spcBef>
               <a:buAutoNum type="arabicPeriod"/>
             </a:pPr>
             <a:r>
-              <a:rPr lang="en-US" sz="1600" b="1" dirty="0" smtClean="0">
+              <a:rPr lang="en-US" sz="1400" b="1" dirty="0" smtClean="0">
                 <a:solidFill>
                   <a:schemeClr val="tx1">
                     <a:lumMod val="75000"/>
@@ -7834,7 +7864,7 @@
           <p:cNvPr id="18" name="TextBox 47">
             <a:extLst>
               <a:ext uri="{FF2B5EF4-FFF2-40B4-BE49-F238E27FC236}">
-                <a16:creationId xmlns="" xmlns:a16="http://schemas.microsoft.com/office/drawing/2014/main" id="{A11FA36C-8B09-47A5-A9E8-B41DE0D47FEA}"/>
+                <a16:creationId xmlns:a16="http://schemas.microsoft.com/office/drawing/2014/main" xmlns="" id="{A11FA36C-8B09-47A5-A9E8-B41DE0D47FEA}"/>
               </a:ext>
             </a:extLst>
           </p:cNvPr>
@@ -7843,8 +7873,8 @@
         </p:nvSpPr>
         <p:spPr>
           <a:xfrm flipH="1">
-            <a:off x="346081" y="3739721"/>
-            <a:ext cx="2693422" cy="2954655"/>
+            <a:off x="346081" y="2889190"/>
+            <a:ext cx="2693422" cy="3539430"/>
           </a:xfrm>
           <a:prstGeom prst="rect">
             <a:avLst/>
@@ -7956,10 +7986,13 @@
           </a:lstStyle>
           <a:p>
             <a:pPr marL="342900" indent="-342900">
+              <a:spcBef>
+                <a:spcPts val="600"/>
+              </a:spcBef>
               <a:buAutoNum type="arabicPeriod"/>
             </a:pPr>
             <a:r>
-              <a:rPr lang="en-US" sz="1600" b="1" dirty="0" smtClean="0">
+              <a:rPr lang="en-US" sz="1400" b="1" dirty="0" smtClean="0">
                 <a:solidFill>
                   <a:schemeClr val="tx1">
                     <a:lumMod val="75000"/>
@@ -7972,10 +8005,13 @@
           </a:p>
           <a:p>
             <a:pPr marL="342900" indent="-342900">
+              <a:spcBef>
+                <a:spcPts val="600"/>
+              </a:spcBef>
               <a:buAutoNum type="arabicPeriod"/>
             </a:pPr>
             <a:r>
-              <a:rPr lang="en-US" sz="1600" b="1" dirty="0" smtClean="0">
+              <a:rPr lang="en-US" sz="1400" b="1" dirty="0" smtClean="0">
                 <a:solidFill>
                   <a:schemeClr val="tx1">
                     <a:lumMod val="75000"/>
@@ -7988,10 +8024,13 @@
           </a:p>
           <a:p>
             <a:pPr marL="342900" indent="-342900">
+              <a:spcBef>
+                <a:spcPts val="600"/>
+              </a:spcBef>
               <a:buAutoNum type="arabicPeriod"/>
             </a:pPr>
             <a:r>
-              <a:rPr lang="en-US" sz="1600" b="1" dirty="0" smtClean="0">
+              <a:rPr lang="en-US" sz="1400" b="1" dirty="0" smtClean="0">
                 <a:solidFill>
                   <a:schemeClr val="tx1">
                     <a:lumMod val="75000"/>
@@ -8004,10 +8043,13 @@
           </a:p>
           <a:p>
             <a:pPr marL="342900" indent="-342900">
+              <a:spcBef>
+                <a:spcPts val="600"/>
+              </a:spcBef>
               <a:buAutoNum type="arabicPeriod"/>
             </a:pPr>
             <a:r>
-              <a:rPr lang="en-US" sz="1600" b="1" dirty="0" smtClean="0">
+              <a:rPr lang="en-US" sz="1400" b="1" dirty="0" smtClean="0">
                 <a:solidFill>
                   <a:schemeClr val="tx1">
                     <a:lumMod val="75000"/>
@@ -8015,9 +8057,83 @@
                   </a:schemeClr>
                 </a:solidFill>
               </a:rPr>
-              <a:t>Completed a Coding Bootcamp to learn more about technology</a:t>
-            </a:r>
-            <a:endParaRPr lang="en-US" sz="1600" b="1" dirty="0">
+              <a:t>Completed a Coding Bootcamp </a:t>
+            </a:r>
+            <a:r>
+              <a:rPr lang="en-US" sz="1400" b="1" dirty="0" smtClean="0">
+                <a:solidFill>
+                  <a:schemeClr val="tx1">
+                    <a:lumMod val="75000"/>
+                    <a:lumOff val="25000"/>
+                  </a:schemeClr>
+                </a:solidFill>
+              </a:rPr>
+              <a:t>(UW) to </a:t>
+            </a:r>
+            <a:r>
+              <a:rPr lang="en-US" sz="1400" b="1" dirty="0" smtClean="0">
+                <a:solidFill>
+                  <a:schemeClr val="tx1">
+                    <a:lumMod val="75000"/>
+                    <a:lumOff val="25000"/>
+                  </a:schemeClr>
+                </a:solidFill>
+              </a:rPr>
+              <a:t>learn more about </a:t>
+            </a:r>
+            <a:r>
+              <a:rPr lang="en-US" sz="1400" b="1" dirty="0" smtClean="0">
+                <a:solidFill>
+                  <a:schemeClr val="tx1">
+                    <a:lumMod val="75000"/>
+                    <a:lumOff val="25000"/>
+                  </a:schemeClr>
+                </a:solidFill>
+              </a:rPr>
+              <a:t>technology</a:t>
+            </a:r>
+          </a:p>
+          <a:p>
+            <a:pPr marL="342900" indent="-342900">
+              <a:spcBef>
+                <a:spcPts val="600"/>
+              </a:spcBef>
+              <a:buAutoNum type="arabicPeriod"/>
+            </a:pPr>
+            <a:r>
+              <a:rPr lang="en-US" sz="1400" b="1" dirty="0" smtClean="0">
+                <a:solidFill>
+                  <a:schemeClr val="tx1">
+                    <a:lumMod val="75000"/>
+                    <a:lumOff val="25000"/>
+                  </a:schemeClr>
+                </a:solidFill>
+              </a:rPr>
+              <a:t>Enrolled in Graduate Certificate Program in Software Design and Development </a:t>
+            </a:r>
+            <a:r>
+              <a:rPr lang="en-US" sz="1400" b="1" dirty="0">
+                <a:solidFill>
+                  <a:schemeClr val="tx1">
+                    <a:lumMod val="75000"/>
+                    <a:lumOff val="25000"/>
+                  </a:schemeClr>
+                </a:solidFill>
+              </a:rPr>
+              <a:t>(</a:t>
+            </a:r>
+            <a:r>
+              <a:rPr lang="en-US" sz="1400" b="1" dirty="0" smtClean="0">
+                <a:solidFill>
+                  <a:schemeClr val="tx1">
+                    <a:lumMod val="75000"/>
+                    <a:lumOff val="25000"/>
+                  </a:schemeClr>
+                </a:solidFill>
+              </a:rPr>
+              <a:t>UW)</a:t>
+            </a:r>
+            <a:endParaRPr lang="en-US" sz="1400" b="1" dirty="0">
               <a:solidFill>
                 <a:schemeClr val="tx1">
                   <a:lumMod val="75000"/>
@@ -8033,7 +8149,7 @@
           <p:cNvPr id="19" name="TextBox 47">
             <a:extLst>
               <a:ext uri="{FF2B5EF4-FFF2-40B4-BE49-F238E27FC236}">
-                <a16:creationId xmlns="" xmlns:a16="http://schemas.microsoft.com/office/drawing/2014/main" id="{237F4DAA-F6F7-4DC2-B578-6D414BEF74B0}"/>
+                <a16:creationId xmlns:a16="http://schemas.microsoft.com/office/drawing/2014/main" xmlns="" id="{237F4DAA-F6F7-4DC2-B578-6D414BEF74B0}"/>
               </a:ext>
             </a:extLst>
           </p:cNvPr>
@@ -8178,7 +8294,7 @@
           <p:cNvPr id="20" name="TextBox 47">
             <a:extLst>
               <a:ext uri="{FF2B5EF4-FFF2-40B4-BE49-F238E27FC236}">
-                <a16:creationId xmlns="" xmlns:a16="http://schemas.microsoft.com/office/drawing/2014/main" id="{DC0A9957-E152-49C0-B103-E3AA9D206C7A}"/>
+                <a16:creationId xmlns:a16="http://schemas.microsoft.com/office/drawing/2014/main" xmlns="" id="{DC0A9957-E152-49C0-B103-E3AA9D206C7A}"/>
               </a:ext>
             </a:extLst>
           </p:cNvPr>
@@ -8322,7 +8438,7 @@
           <p:cNvPr id="21" name="TextBox 47">
             <a:extLst>
               <a:ext uri="{FF2B5EF4-FFF2-40B4-BE49-F238E27FC236}">
-                <a16:creationId xmlns="" xmlns:a16="http://schemas.microsoft.com/office/drawing/2014/main" id="{ECA5C0CC-DE7F-4793-B26A-CEF2C3D04658}"/>
+                <a16:creationId xmlns:a16="http://schemas.microsoft.com/office/drawing/2014/main" xmlns="" id="{ECA5C0CC-DE7F-4793-B26A-CEF2C3D04658}"/>
               </a:ext>
             </a:extLst>
           </p:cNvPr>
@@ -8511,7 +8627,7 @@
           <p:cNvPr id="6" name="Picture 5">
             <a:extLst>
               <a:ext uri="{C183D7F6-B498-43B3-948B-1728B52AA6E4}">
-                <adec:decorative xmlns:adec="http://schemas.microsoft.com/office/drawing/2017/decorative" xmlns="" val="1"/>
+                <adec:decorative xmlns="" xmlns:adec="http://schemas.microsoft.com/office/drawing/2017/decorative" val="1"/>
               </a:ext>
             </a:extLst>
           </p:cNvPr>
@@ -8600,7 +8716,7 @@
           <p:cNvPr id="5" name="Rectangle 4">
             <a:extLst>
               <a:ext uri="{C183D7F6-B498-43B3-948B-1728B52AA6E4}">
-                <adec:decorative xmlns:adec="http://schemas.microsoft.com/office/drawing/2017/decorative" xmlns="" val="1"/>
+                <adec:decorative xmlns="" xmlns:adec="http://schemas.microsoft.com/office/drawing/2017/decorative" val="1"/>
               </a:ext>
             </a:extLst>
           </p:cNvPr>
@@ -8666,7 +8782,7 @@
           <p:cNvPr id="2" name="Title 1" hidden="1">
             <a:extLst>
               <a:ext uri="{FF2B5EF4-FFF2-40B4-BE49-F238E27FC236}">
-                <a16:creationId xmlns:a16="http://schemas.microsoft.com/office/drawing/2014/main" xmlns="" id="{10E603A3-B905-4FE4-AF3D-7ABD07598BAD}"/>
+                <a16:creationId xmlns="" xmlns:a16="http://schemas.microsoft.com/office/drawing/2014/main" id="{10E603A3-B905-4FE4-AF3D-7ABD07598BAD}"/>
               </a:ext>
             </a:extLst>
           </p:cNvPr>
@@ -8751,7 +8867,7 @@
         <p:spPr>
           <a:xfrm>
             <a:off x="1309525" y="1642672"/>
-            <a:ext cx="10196675" cy="4401205"/>
+            <a:ext cx="10196675" cy="4570482"/>
           </a:xfrm>
           <a:prstGeom prst="rect">
             <a:avLst/>
@@ -8765,32 +8881,38 @@
           <a:lstStyle/>
           <a:p>
             <a:pPr marL="342900" indent="-342900">
+              <a:spcBef>
+                <a:spcPts val="1800"/>
+              </a:spcBef>
               <a:buFont typeface="Arial" panose="020B0604020202020204" pitchFamily="34" charset="0"/>
               <a:buChar char="•"/>
             </a:pPr>
             <a:r>
-              <a:rPr lang="en-US" sz="2800" b="1" dirty="0">
+              <a:rPr lang="en-US" sz="2400" b="1" dirty="0">
                 <a:cs typeface="Andalus" panose="02020603050405020304" pitchFamily="18" charset="-78"/>
               </a:rPr>
               <a:t>BS in Accounting and MS in </a:t>
             </a:r>
             <a:r>
-              <a:rPr lang="en-US" sz="2800" b="1" dirty="0" smtClean="0">
+              <a:rPr lang="en-US" sz="2400" b="1" dirty="0" smtClean="0">
                 <a:cs typeface="Andalus" panose="02020603050405020304" pitchFamily="18" charset="-78"/>
               </a:rPr>
               <a:t>Taxation, CPA</a:t>
             </a:r>
-            <a:endParaRPr lang="en-US" sz="2800" b="1" dirty="0">
+            <a:endParaRPr lang="en-US" sz="2400" b="1" dirty="0">
               <a:cs typeface="Andalus" panose="02020603050405020304" pitchFamily="18" charset="-78"/>
             </a:endParaRPr>
           </a:p>
           <a:p>
             <a:pPr marL="342900" indent="-342900">
+              <a:spcBef>
+                <a:spcPts val="1800"/>
+              </a:spcBef>
               <a:buFont typeface="Arial" panose="020B0604020202020204" pitchFamily="34" charset="0"/>
               <a:buChar char="•"/>
             </a:pPr>
             <a:r>
-              <a:rPr lang="en-US" sz="2800" b="1" dirty="0" smtClean="0">
+              <a:rPr lang="en-US" sz="2400" b="1" dirty="0" smtClean="0">
                 <a:cs typeface="Andalus" panose="02020603050405020304" pitchFamily="18" charset="-78"/>
               </a:rPr>
               <a:t>Experience in audit, tax, accounting, and financial analysis </a:t>
@@ -8798,11 +8920,14 @@
           </a:p>
           <a:p>
             <a:pPr marL="342900" indent="-342900">
+              <a:spcBef>
+                <a:spcPts val="1800"/>
+              </a:spcBef>
               <a:buFont typeface="Arial" panose="020B0604020202020204" pitchFamily="34" charset="0"/>
               <a:buChar char="•"/>
             </a:pPr>
             <a:r>
-              <a:rPr lang="en-US" sz="2800" b="1" dirty="0" smtClean="0">
+              <a:rPr lang="en-US" sz="2400" b="1" dirty="0" smtClean="0">
                 <a:cs typeface="Andalus" panose="02020603050405020304" pitchFamily="18" charset="-78"/>
               </a:rPr>
               <a:t>Was in charge of full accounting cycle and a lead for AP and AR teams</a:t>
@@ -8810,11 +8935,14 @@
           </a:p>
           <a:p>
             <a:pPr marL="342900" indent="-342900">
+              <a:spcBef>
+                <a:spcPts val="1800"/>
+              </a:spcBef>
               <a:buFont typeface="Arial" panose="020B0604020202020204" pitchFamily="34" charset="0"/>
               <a:buChar char="•"/>
             </a:pPr>
             <a:r>
-              <a:rPr lang="en-US" sz="2800" b="1" dirty="0" smtClean="0">
+              <a:rPr lang="en-US" sz="2400" b="1" dirty="0" smtClean="0">
                 <a:cs typeface="Andalus" panose="02020603050405020304" pitchFamily="18" charset="-78"/>
               </a:rPr>
               <a:t>Extensive experience in reconciling data and accounts during system change and business consolidation process</a:t>
@@ -8822,33 +8950,39 @@
           </a:p>
           <a:p>
             <a:pPr marL="342900" indent="-342900">
+              <a:spcBef>
+                <a:spcPts val="1800"/>
+              </a:spcBef>
               <a:buFont typeface="Arial" panose="020B0604020202020204" pitchFamily="34" charset="0"/>
               <a:buChar char="•"/>
             </a:pPr>
             <a:r>
-              <a:rPr lang="en-US" sz="2800" b="1" dirty="0"/>
+              <a:rPr lang="en-US" sz="2400" b="1" dirty="0"/>
               <a:t>Knowledge and application of </a:t>
             </a:r>
             <a:r>
-              <a:rPr lang="en-US" sz="2800" b="1" dirty="0" smtClean="0"/>
+              <a:rPr lang="en-US" sz="2400" b="1" dirty="0" smtClean="0"/>
               <a:t>GAAP and </a:t>
             </a:r>
             <a:r>
-              <a:rPr lang="en-US" sz="2800" b="1" dirty="0"/>
+              <a:rPr lang="en-US" sz="2400" b="1" dirty="0"/>
               <a:t>internal control practices and </a:t>
             </a:r>
             <a:r>
-              <a:rPr lang="en-US" sz="2800" b="1" dirty="0" smtClean="0"/>
+              <a:rPr lang="en-US" sz="2400" b="1" dirty="0" smtClean="0"/>
               <a:t>techniques</a:t>
             </a:r>
           </a:p>
           <a:p>
             <a:pPr marL="342900" indent="-342900">
+              <a:spcBef>
+                <a:spcPts val="1800"/>
+              </a:spcBef>
               <a:buFont typeface="Arial" panose="020B0604020202020204" pitchFamily="34" charset="0"/>
               <a:buChar char="•"/>
             </a:pPr>
             <a:r>
-              <a:rPr lang="en-US" sz="2800" b="1" dirty="0" smtClean="0">
+              <a:rPr lang="en-US" sz="2400" b="1" dirty="0" smtClean="0">
                 <a:cs typeface="Andalus" panose="02020603050405020304" pitchFamily="18" charset="-78"/>
               </a:rPr>
               <a:t>Familiar with governmental accounting (took elective course at the university)</a:t>
@@ -9407,7 +9541,7 @@
           <p:cNvPr id="6" name="Picture 5">
             <a:extLst>
               <a:ext uri="{C183D7F6-B498-43B3-948B-1728B52AA6E4}">
-                <adec:decorative xmlns:adec="http://schemas.microsoft.com/office/drawing/2017/decorative" xmlns="" val="1"/>
+                <adec:decorative xmlns="" xmlns:adec="http://schemas.microsoft.com/office/drawing/2017/decorative" val="1"/>
               </a:ext>
             </a:extLst>
           </p:cNvPr>
@@ -9496,7 +9630,7 @@
           <p:cNvPr id="5" name="Rectangle 4">
             <a:extLst>
               <a:ext uri="{C183D7F6-B498-43B3-948B-1728B52AA6E4}">
-                <adec:decorative xmlns:adec="http://schemas.microsoft.com/office/drawing/2017/decorative" xmlns="" val="1"/>
+                <adec:decorative xmlns="" xmlns:adec="http://schemas.microsoft.com/office/drawing/2017/decorative" val="1"/>
               </a:ext>
             </a:extLst>
           </p:cNvPr>
@@ -9562,7 +9696,7 @@
           <p:cNvPr id="2" name="Title 1" hidden="1">
             <a:extLst>
               <a:ext uri="{FF2B5EF4-FFF2-40B4-BE49-F238E27FC236}">
-                <a16:creationId xmlns:a16="http://schemas.microsoft.com/office/drawing/2014/main" xmlns="" id="{10E603A3-B905-4FE4-AF3D-7ABD07598BAD}"/>
+                <a16:creationId xmlns="" xmlns:a16="http://schemas.microsoft.com/office/drawing/2014/main" id="{10E603A3-B905-4FE4-AF3D-7ABD07598BAD}"/>
               </a:ext>
             </a:extLst>
           </p:cNvPr>
@@ -9630,7 +9764,13 @@
               <a:rPr lang="en-US" b="1" dirty="0" smtClean="0">
                 <a:latin typeface="+mn-lt"/>
               </a:rPr>
-              <a:t>My Background - Finance</a:t>
+              <a:t>My Background </a:t>
+            </a:r>
+            <a:r>
+              <a:rPr lang="en-US" b="1" dirty="0" smtClean="0">
+                <a:latin typeface="+mn-lt"/>
+              </a:rPr>
+              <a:t>– Finance/Analytics</a:t>
             </a:r>
             <a:endParaRPr lang="en-US" b="1" dirty="0">
               <a:latin typeface="+mn-lt"/>
@@ -9647,7 +9787,7 @@
         <p:spPr>
           <a:xfrm>
             <a:off x="1309525" y="1924509"/>
-            <a:ext cx="10196675" cy="3970318"/>
+            <a:ext cx="10196675" cy="4031873"/>
           </a:xfrm>
           <a:prstGeom prst="rect">
             <a:avLst/>
@@ -9661,6 +9801,9 @@
           <a:lstStyle/>
           <a:p>
             <a:pPr marL="342900" indent="-342900">
+              <a:spcBef>
+                <a:spcPts val="1800"/>
+              </a:spcBef>
               <a:buFont typeface="Arial" panose="020B0604020202020204" pitchFamily="34" charset="0"/>
               <a:buChar char="•"/>
             </a:pPr>
@@ -9672,6 +9815,9 @@
           </a:p>
           <a:p>
             <a:pPr marL="342900" indent="-342900">
+              <a:spcBef>
+                <a:spcPts val="1800"/>
+              </a:spcBef>
               <a:buFont typeface="Arial" panose="020B0604020202020204" pitchFamily="34" charset="0"/>
               <a:buChar char="•"/>
             </a:pPr>
@@ -9684,6 +9830,9 @@
           </a:p>
           <a:p>
             <a:pPr marL="342900" indent="-342900">
+              <a:spcBef>
+                <a:spcPts val="1800"/>
+              </a:spcBef>
               <a:buFont typeface="Arial" panose="020B0604020202020204" pitchFamily="34" charset="0"/>
               <a:buChar char="•"/>
             </a:pPr>
@@ -9708,6 +9857,9 @@
           </a:p>
           <a:p>
             <a:pPr marL="342900" indent="-342900">
+              <a:spcBef>
+                <a:spcPts val="1800"/>
+              </a:spcBef>
               <a:buFont typeface="Arial" panose="020B0604020202020204" pitchFamily="34" charset="0"/>
               <a:buChar char="•"/>
             </a:pPr>
@@ -9722,6 +9874,9 @@
           </a:p>
           <a:p>
             <a:pPr marL="342900" indent="-342900">
+              <a:spcBef>
+                <a:spcPts val="1800"/>
+              </a:spcBef>
               <a:buFont typeface="Arial" panose="020B0604020202020204" pitchFamily="34" charset="0"/>
               <a:buChar char="•"/>
             </a:pPr>
@@ -9731,27 +9886,12 @@
             </a:r>
             <a:r>
               <a:rPr lang="en-US" sz="2800" b="1" dirty="0"/>
-              <a:t>for management</a:t>
-            </a:r>
-            <a:endParaRPr lang="en-US" sz="2800" b="1" dirty="0">
-              <a:latin typeface="Andalus" panose="02020603050405020304" pitchFamily="18" charset="-78"/>
-              <a:cs typeface="Andalus" panose="02020603050405020304" pitchFamily="18" charset="-78"/>
-            </a:endParaRPr>
-          </a:p>
-          <a:p>
-            <a:pPr marL="342900" indent="-342900">
-              <a:buFont typeface="Arial" panose="020B0604020202020204" pitchFamily="34" charset="0"/>
-              <a:buChar char="•"/>
-            </a:pPr>
-            <a:endParaRPr lang="en-US" sz="2800" b="1" dirty="0" smtClean="0">
-              <a:cs typeface="Andalus" panose="02020603050405020304" pitchFamily="18" charset="-78"/>
-            </a:endParaRPr>
-          </a:p>
-          <a:p>
-            <a:pPr marL="342900" indent="-342900">
-              <a:buFont typeface="Arial" panose="020B0604020202020204" pitchFamily="34" charset="0"/>
-              <a:buChar char="•"/>
-            </a:pPr>
+              <a:t>for </a:t>
+            </a:r>
+            <a:r>
+              <a:rPr lang="en-US" sz="2800" b="1" dirty="0" smtClean="0"/>
+              <a:t>management</a:t>
+            </a:r>
             <a:endParaRPr lang="en-US" sz="2800" b="1" dirty="0">
               <a:cs typeface="Andalus" panose="02020603050405020304" pitchFamily="18" charset="-78"/>
             </a:endParaRPr>
@@ -10236,7 +10376,7 @@
           <p:cNvPr id="6" name="Picture 5">
             <a:extLst>
               <a:ext uri="{C183D7F6-B498-43B3-948B-1728B52AA6E4}">
-                <adec:decorative xmlns:adec="http://schemas.microsoft.com/office/drawing/2017/decorative" xmlns="" val="1"/>
+                <adec:decorative xmlns="" xmlns:adec="http://schemas.microsoft.com/office/drawing/2017/decorative" val="1"/>
               </a:ext>
             </a:extLst>
           </p:cNvPr>
@@ -10325,7 +10465,7 @@
           <p:cNvPr id="5" name="Rectangle 4">
             <a:extLst>
               <a:ext uri="{C183D7F6-B498-43B3-948B-1728B52AA6E4}">
-                <adec:decorative xmlns:adec="http://schemas.microsoft.com/office/drawing/2017/decorative" xmlns="" val="1"/>
+                <adec:decorative xmlns="" xmlns:adec="http://schemas.microsoft.com/office/drawing/2017/decorative" val="1"/>
               </a:ext>
             </a:extLst>
           </p:cNvPr>
@@ -10391,7 +10531,7 @@
           <p:cNvPr id="2" name="Title 1" hidden="1">
             <a:extLst>
               <a:ext uri="{FF2B5EF4-FFF2-40B4-BE49-F238E27FC236}">
-                <a16:creationId xmlns:a16="http://schemas.microsoft.com/office/drawing/2014/main" xmlns="" id="{10E603A3-B905-4FE4-AF3D-7ABD07598BAD}"/>
+                <a16:creationId xmlns="" xmlns:a16="http://schemas.microsoft.com/office/drawing/2014/main" id="{10E603A3-B905-4FE4-AF3D-7ABD07598BAD}"/>
               </a:ext>
             </a:extLst>
           </p:cNvPr>
@@ -10419,7 +10559,7 @@
           <p:cNvPr id="8" name="Picture 7">
             <a:extLst>
               <a:ext uri="{C183D7F6-B498-43B3-948B-1728B52AA6E4}">
-                <adec:decorative xmlns:adec="http://schemas.microsoft.com/office/drawing/2017/decorative" xmlns="" val="1"/>
+                <adec:decorative xmlns="" xmlns:adec="http://schemas.microsoft.com/office/drawing/2017/decorative" val="1"/>
               </a:ext>
             </a:extLst>
           </p:cNvPr>
@@ -10508,7 +10648,7 @@
           <p:cNvPr id="9" name="Rectangle 8">
             <a:extLst>
               <a:ext uri="{C183D7F6-B498-43B3-948B-1728B52AA6E4}">
-                <adec:decorative xmlns:adec="http://schemas.microsoft.com/office/drawing/2017/decorative" xmlns="" val="1"/>
+                <adec:decorative xmlns="" xmlns:adec="http://schemas.microsoft.com/office/drawing/2017/decorative" val="1"/>
               </a:ext>
             </a:extLst>
           </p:cNvPr>
@@ -10517,7 +10657,7 @@
         </p:nvSpPr>
         <p:spPr>
           <a:xfrm>
-            <a:off x="953" y="-81420"/>
+            <a:off x="-954" y="-81420"/>
             <a:ext cx="12192000" cy="6939420"/>
           </a:xfrm>
           <a:prstGeom prst="rect">
@@ -10630,8 +10770,8 @@
         </p:nvSpPr>
         <p:spPr>
           <a:xfrm>
-            <a:off x="1310478" y="1467308"/>
-            <a:ext cx="10196675" cy="4893647"/>
+            <a:off x="1310478" y="1345388"/>
+            <a:ext cx="10196675" cy="5170646"/>
           </a:xfrm>
           <a:prstGeom prst="rect">
             <a:avLst/>
@@ -10645,96 +10785,149 @@
           <a:lstStyle/>
           <a:p>
             <a:pPr marL="342900" indent="-342900">
+              <a:spcBef>
+                <a:spcPts val="1800"/>
+              </a:spcBef>
               <a:buFont typeface="Arial" panose="020B0604020202020204" pitchFamily="34" charset="0"/>
               <a:buChar char="•"/>
             </a:pPr>
             <a:r>
-              <a:rPr lang="en-US" sz="2400" b="1" dirty="0" smtClean="0">
+              <a:rPr lang="en-US" sz="2000" b="1" dirty="0" smtClean="0">
                 <a:cs typeface="Andalus" panose="02020603050405020304" pitchFamily="18" charset="-78"/>
               </a:rPr>
-              <a:t>Experience building SQL queries</a:t>
+              <a:t>Experience building SQL </a:t>
+            </a:r>
+            <a:r>
+              <a:rPr lang="en-US" sz="2000" b="1" dirty="0" smtClean="0">
+                <a:cs typeface="Andalus" panose="02020603050405020304" pitchFamily="18" charset="-78"/>
+              </a:rPr>
+              <a:t>queries</a:t>
             </a:r>
           </a:p>
           <a:p>
             <a:pPr marL="342900" indent="-342900">
+              <a:spcBef>
+                <a:spcPts val="1800"/>
+              </a:spcBef>
               <a:buFont typeface="Arial" panose="020B0604020202020204" pitchFamily="34" charset="0"/>
               <a:buChar char="•"/>
             </a:pPr>
             <a:r>
-              <a:rPr lang="en-US" sz="2400" b="1" dirty="0"/>
-              <a:t>W</a:t>
-            </a:r>
-            <a:r>
-              <a:rPr lang="en-US" sz="2400" b="1" dirty="0" smtClean="0"/>
-              <a:t>as </a:t>
-            </a:r>
-            <a:r>
-              <a:rPr lang="en-US" sz="2400" b="1" dirty="0"/>
+              <a:rPr lang="en-US" sz="2000" b="1" dirty="0" smtClean="0"/>
+              <a:t>Was </a:t>
+            </a:r>
+            <a:r>
+              <a:rPr lang="en-US" sz="2000" b="1" dirty="0"/>
               <a:t>in charge of software </a:t>
             </a:r>
             <a:r>
-              <a:rPr lang="en-US" sz="2400" b="1" dirty="0" smtClean="0"/>
+              <a:rPr lang="en-US" sz="2000" b="1" dirty="0" smtClean="0"/>
               <a:t>validation </a:t>
             </a:r>
           </a:p>
           <a:p>
             <a:pPr marL="342900" indent="-342900">
+              <a:spcBef>
+                <a:spcPts val="1800"/>
+              </a:spcBef>
               <a:buFont typeface="Arial" panose="020B0604020202020204" pitchFamily="34" charset="0"/>
               <a:buChar char="•"/>
             </a:pPr>
             <a:r>
-              <a:rPr lang="en-US" sz="2400" b="1" dirty="0" smtClean="0"/>
+              <a:rPr lang="en-US" sz="2000" b="1" dirty="0" smtClean="0"/>
               <a:t>Tested </a:t>
             </a:r>
             <a:r>
-              <a:rPr lang="en-US" sz="2400" b="1" dirty="0"/>
+              <a:rPr lang="en-US" sz="2000" b="1" dirty="0"/>
               <a:t>the system using different scenarios to make sure that all invoices were recorded correctly, mathematical calculations were accurate, and integration process between accounting and operational systems was </a:t>
             </a:r>
             <a:r>
-              <a:rPr lang="en-US" sz="2400" b="1" dirty="0" smtClean="0"/>
+              <a:rPr lang="en-US" sz="2000" b="1" dirty="0" smtClean="0"/>
               <a:t>complete </a:t>
             </a:r>
           </a:p>
           <a:p>
             <a:pPr marL="342900" indent="-342900">
+              <a:spcBef>
+                <a:spcPts val="1800"/>
+              </a:spcBef>
               <a:buFont typeface="Arial" panose="020B0604020202020204" pitchFamily="34" charset="0"/>
               <a:buChar char="•"/>
             </a:pPr>
             <a:r>
-              <a:rPr lang="en-US" sz="2400" b="1" dirty="0" smtClean="0"/>
+              <a:rPr lang="en-US" sz="2000" b="1" dirty="0" smtClean="0"/>
               <a:t>Collected </a:t>
             </a:r>
             <a:r>
-              <a:rPr lang="en-US" sz="2400" b="1" dirty="0"/>
+              <a:rPr lang="en-US" sz="2000" b="1" dirty="0"/>
               <a:t>application errors, submitted tickets with detailed descriptions of the problem, communicated tasks to software development team, and reviewed tickets once the issues were fixed. As a result, the system was released for production, and financial statements were reconciled without application errors</a:t>
             </a:r>
             <a:r>
-              <a:rPr lang="en-US" sz="2400" b="1" dirty="0" smtClean="0"/>
+              <a:rPr lang="en-US" sz="2000" b="1" dirty="0" smtClean="0"/>
               <a:t>.</a:t>
             </a:r>
           </a:p>
           <a:p>
             <a:pPr marL="342900" indent="-342900">
+              <a:spcBef>
+                <a:spcPts val="1800"/>
+              </a:spcBef>
               <a:buFont typeface="Arial" panose="020B0604020202020204" pitchFamily="34" charset="0"/>
               <a:buChar char="•"/>
             </a:pPr>
             <a:r>
-              <a:rPr lang="en-US" sz="2400" b="1" dirty="0" smtClean="0"/>
+              <a:rPr lang="en-US" sz="2000" b="1" dirty="0" smtClean="0"/>
               <a:t>Prepared instructions for staff for new processes and technologies</a:t>
             </a:r>
           </a:p>
           <a:p>
             <a:pPr marL="342900" indent="-342900">
+              <a:spcBef>
+                <a:spcPts val="1800"/>
+              </a:spcBef>
               <a:buFont typeface="Arial" panose="020B0604020202020204" pitchFamily="34" charset="0"/>
               <a:buChar char="•"/>
             </a:pPr>
             <a:r>
-              <a:rPr lang="en-US" sz="2400" b="1" dirty="0" smtClean="0">
+              <a:rPr lang="en-US" sz="2000" b="1" dirty="0" smtClean="0">
                 <a:cs typeface="Andalus" panose="02020603050405020304" pitchFamily="18" charset="-78"/>
               </a:rPr>
-              <a:t>Completed a Coding Bootcamp to learn more about technologies</a:t>
-            </a:r>
-            <a:endParaRPr lang="en-US" sz="2400" b="1" dirty="0">
+              <a:t>Completed a Coding </a:t>
+            </a:r>
+            <a:r>
+              <a:rPr lang="en-US" sz="2000" b="1" dirty="0" smtClean="0">
+                <a:cs typeface="Andalus" panose="02020603050405020304" pitchFamily="18" charset="-78"/>
+              </a:rPr>
+              <a:t>Bootcamp (UW) </a:t>
+            </a:r>
+            <a:r>
+              <a:rPr lang="en-US" sz="2000" b="1" dirty="0" smtClean="0">
+                <a:cs typeface="Andalus" panose="02020603050405020304" pitchFamily="18" charset="-78"/>
+              </a:rPr>
+              <a:t>to learn more about </a:t>
+            </a:r>
+            <a:r>
+              <a:rPr lang="en-US" sz="2000" b="1" dirty="0" smtClean="0">
+                <a:cs typeface="Andalus" panose="02020603050405020304" pitchFamily="18" charset="-78"/>
+              </a:rPr>
+              <a:t>technologies</a:t>
+            </a:r>
+          </a:p>
+          <a:p>
+            <a:pPr marL="342900" indent="-342900">
+              <a:spcBef>
+                <a:spcPts val="1800"/>
+              </a:spcBef>
+              <a:buFont typeface="Arial" panose="020B0604020202020204" pitchFamily="34" charset="0"/>
+              <a:buChar char="•"/>
+            </a:pPr>
+            <a:r>
+              <a:rPr lang="en-US" sz="2000" b="1" dirty="0" smtClean="0">
+                <a:cs typeface="Andalus" panose="02020603050405020304" pitchFamily="18" charset="-78"/>
+              </a:rPr>
+              <a:t>Enrolled in Graduate Certificate Program in Software Design and Development (UW)</a:t>
+            </a:r>
+            <a:endParaRPr lang="en-US" sz="2000" b="1" dirty="0">
               <a:cs typeface="Andalus" panose="02020603050405020304" pitchFamily="18" charset="-78"/>
             </a:endParaRPr>
           </a:p>
@@ -11244,6 +11437,87 @@
                       </p:childTnLst>
                     </p:cTn>
                   </p:par>
+                  <p:par>
+                    <p:cTn id="33" fill="hold">
+                      <p:stCondLst>
+                        <p:cond delay="indefinite"/>
+                      </p:stCondLst>
+                      <p:childTnLst>
+                        <p:par>
+                          <p:cTn id="34" fill="hold">
+                            <p:stCondLst>
+                              <p:cond delay="0"/>
+                            </p:stCondLst>
+                            <p:childTnLst>
+                              <p:par>
+                                <p:cTn id="35" presetID="22" presetClass="entr" presetSubtype="8" fill="hold" nodeType="clickEffect">
+                                  <p:stCondLst>
+                                    <p:cond delay="0"/>
+                                  </p:stCondLst>
+                                  <p:childTnLst>
+                                    <p:set>
+                                      <p:cBhvr>
+                                        <p:cTn id="36" dur="1" fill="hold">
+                                          <p:stCondLst>
+                                            <p:cond delay="0"/>
+                                          </p:stCondLst>
+                                        </p:cTn>
+                                        <p:tgtEl>
+                                          <p:spTgt spid="11">
+                                            <p:txEl>
+                                              <p:pRg st="6" end="6"/>
+                                            </p:txEl>
+                                          </p:spTgt>
+                                        </p:tgtEl>
+                                        <p:attrNameLst>
+                                          <p:attrName>style.visibility</p:attrName>
+                                        </p:attrNameLst>
+                                      </p:cBhvr>
+                                      <p:to>
+                                        <p:strVal val="visible"/>
+                                      </p:to>
+                                    </p:set>
+                                    <p:animEffect transition="in" filter="wipe(left)">
+                                      <p:cBhvr>
+                                        <p:cTn id="37" dur="500"/>
+                                        <p:tgtEl>
+                                          <p:spTgt spid="11">
+                                            <p:txEl>
+                                              <p:pRg st="6" end="6"/>
+                                            </p:txEl>
+                                          </p:spTgt>
+                                        </p:tgtEl>
+                                      </p:cBhvr>
+                                    </p:animEffect>
+                                  </p:childTnLst>
+                                  <p:subTnLst>
+                                    <p:animClr clrSpc="rgb" dir="cw">
+                                      <p:cBhvr override="childStyle">
+                                        <p:cTn dur="1" fill="hold" display="0" masterRel="nextClick" afterEffect="1"/>
+                                        <p:tgtEl>
+                                          <p:spTgt spid="11">
+                                            <p:txEl>
+                                              <p:pRg st="6" end="6"/>
+                                            </p:txEl>
+                                          </p:spTgt>
+                                        </p:tgtEl>
+                                        <p:attrNameLst>
+                                          <p:attrName>ppt_c</p:attrName>
+                                        </p:attrNameLst>
+                                      </p:cBhvr>
+                                      <p:to>
+                                        <a:schemeClr val="accent1"/>
+                                      </p:to>
+                                    </p:animClr>
+                                  </p:subTnLst>
+                                </p:cTn>
+                              </p:par>
+                            </p:childTnLst>
+                          </p:cTn>
+                        </p:par>
+                      </p:childTnLst>
+                    </p:cTn>
+                  </p:par>
                 </p:childTnLst>
               </p:cTn>
               <p:prevCondLst>
@@ -11299,7 +11573,7 @@
           <p:cNvPr id="6" name="Picture 5">
             <a:extLst>
               <a:ext uri="{C183D7F6-B498-43B3-948B-1728B52AA6E4}">
-                <adec:decorative xmlns:adec="http://schemas.microsoft.com/office/drawing/2017/decorative" xmlns="" val="1"/>
+                <adec:decorative xmlns="" xmlns:adec="http://schemas.microsoft.com/office/drawing/2017/decorative" val="1"/>
               </a:ext>
             </a:extLst>
           </p:cNvPr>
@@ -11388,7 +11662,7 @@
           <p:cNvPr id="5" name="Rectangle 4">
             <a:extLst>
               <a:ext uri="{C183D7F6-B498-43B3-948B-1728B52AA6E4}">
-                <adec:decorative xmlns:adec="http://schemas.microsoft.com/office/drawing/2017/decorative" xmlns="" val="1"/>
+                <adec:decorative xmlns="" xmlns:adec="http://schemas.microsoft.com/office/drawing/2017/decorative" val="1"/>
               </a:ext>
             </a:extLst>
           </p:cNvPr>
@@ -11454,7 +11728,7 @@
           <p:cNvPr id="2" name="Title 1" hidden="1">
             <a:extLst>
               <a:ext uri="{FF2B5EF4-FFF2-40B4-BE49-F238E27FC236}">
-                <a16:creationId xmlns:a16="http://schemas.microsoft.com/office/drawing/2014/main" xmlns="" id="{10E603A3-B905-4FE4-AF3D-7ABD07598BAD}"/>
+                <a16:creationId xmlns="" xmlns:a16="http://schemas.microsoft.com/office/drawing/2014/main" id="{10E603A3-B905-4FE4-AF3D-7ABD07598BAD}"/>
               </a:ext>
             </a:extLst>
           </p:cNvPr>
@@ -11482,7 +11756,7 @@
           <p:cNvPr id="7" name="Picture 6">
             <a:extLst>
               <a:ext uri="{C183D7F6-B498-43B3-948B-1728B52AA6E4}">
-                <adec:decorative xmlns:adec="http://schemas.microsoft.com/office/drawing/2017/decorative" xmlns="" val="1"/>
+                <adec:decorative xmlns="" xmlns:adec="http://schemas.microsoft.com/office/drawing/2017/decorative" val="1"/>
               </a:ext>
             </a:extLst>
           </p:cNvPr>
@@ -11571,7 +11845,7 @@
           <p:cNvPr id="8" name="Rectangle 7">
             <a:extLst>
               <a:ext uri="{C183D7F6-B498-43B3-948B-1728B52AA6E4}">
-                <adec:decorative xmlns:adec="http://schemas.microsoft.com/office/drawing/2017/decorative" xmlns="" val="1"/>
+                <adec:decorative xmlns="" xmlns:adec="http://schemas.microsoft.com/office/drawing/2017/decorative" val="1"/>
               </a:ext>
             </a:extLst>
           </p:cNvPr>
@@ -11637,7 +11911,7 @@
           <p:cNvPr id="9" name="Picture 8">
             <a:extLst>
               <a:ext uri="{C183D7F6-B498-43B3-948B-1728B52AA6E4}">
-                <adec:decorative xmlns:adec="http://schemas.microsoft.com/office/drawing/2017/decorative" xmlns="" val="1"/>
+                <adec:decorative xmlns="" xmlns:adec="http://schemas.microsoft.com/office/drawing/2017/decorative" val="1"/>
               </a:ext>
             </a:extLst>
           </p:cNvPr>
@@ -11726,7 +12000,7 @@
           <p:cNvPr id="10" name="Rectangle 9">
             <a:extLst>
               <a:ext uri="{C183D7F6-B498-43B3-948B-1728B52AA6E4}">
-                <adec:decorative xmlns:adec="http://schemas.microsoft.com/office/drawing/2017/decorative" xmlns="" val="1"/>
+                <adec:decorative xmlns="" xmlns:adec="http://schemas.microsoft.com/office/drawing/2017/decorative" val="1"/>
               </a:ext>
             </a:extLst>
           </p:cNvPr>
@@ -11849,7 +12123,7 @@
         <p:spPr>
           <a:xfrm>
             <a:off x="1310478" y="1467308"/>
-            <a:ext cx="9386749" cy="4278094"/>
+            <a:ext cx="9386749" cy="4108817"/>
           </a:xfrm>
           <a:prstGeom prst="rect">
             <a:avLst/>
@@ -11863,23 +12137,26 @@
           <a:lstStyle/>
           <a:p>
             <a:pPr marL="342900" indent="-342900">
+              <a:spcBef>
+                <a:spcPts val="1800"/>
+              </a:spcBef>
               <a:buFont typeface="Arial" panose="020B0604020202020204" pitchFamily="34" charset="0"/>
               <a:buChar char="•"/>
             </a:pPr>
             <a:r>
-              <a:rPr lang="en-US" sz="2800" b="1" dirty="0" smtClean="0">
+              <a:rPr lang="en-US" sz="2400" b="1" dirty="0" smtClean="0">
                 <a:cs typeface="Andalus" panose="02020603050405020304" pitchFamily="18" charset="-78"/>
               </a:rPr>
               <a:t>Completed UW Coding </a:t>
             </a:r>
             <a:r>
-              <a:rPr lang="en-US" sz="2800" b="1" dirty="0">
+              <a:rPr lang="en-US" sz="2400" b="1" dirty="0">
                 <a:cs typeface="Andalus" panose="02020603050405020304" pitchFamily="18" charset="-78"/>
               </a:rPr>
               <a:t>B</a:t>
             </a:r>
             <a:r>
-              <a:rPr lang="en-US" sz="2800" b="1" dirty="0" smtClean="0">
+              <a:rPr lang="en-US" sz="2400" b="1" dirty="0" smtClean="0">
                 <a:cs typeface="Andalus" panose="02020603050405020304" pitchFamily="18" charset="-78"/>
               </a:rPr>
               <a:t>ootcamp to learn more about technology, as I see a trend of merging finance and technology fields</a:t>
@@ -11887,28 +12164,60 @@
           </a:p>
           <a:p>
             <a:pPr marL="342900" indent="-342900">
+              <a:spcBef>
+                <a:spcPts val="1800"/>
+              </a:spcBef>
               <a:buFont typeface="Arial" panose="020B0604020202020204" pitchFamily="34" charset="0"/>
               <a:buChar char="•"/>
             </a:pPr>
             <a:r>
-              <a:rPr lang="en-US" sz="2800" b="1" dirty="0" smtClean="0"/>
+              <a:rPr lang="en-US" sz="2400" b="1" dirty="0" smtClean="0"/>
               <a:t>Take online classes and courses, for example on Udemy.com, to learn different aspects of finance and technology (for example, I just started Data Science course on Udemy.com).</a:t>
             </a:r>
           </a:p>
           <a:p>
             <a:pPr marL="342900" indent="-342900">
+              <a:spcBef>
+                <a:spcPts val="1800"/>
+              </a:spcBef>
               <a:buFont typeface="Arial" panose="020B0604020202020204" pitchFamily="34" charset="0"/>
               <a:buChar char="•"/>
             </a:pPr>
             <a:r>
-              <a:rPr lang="en-US" sz="2800" b="1" dirty="0" smtClean="0"/>
-              <a:t>Excited about opportunities to grow and learn new skills</a:t>
-            </a:r>
-          </a:p>
-          <a:p>
-            <a:endParaRPr lang="en-US" sz="2400" b="1" dirty="0" smtClean="0"/>
-          </a:p>
-          <a:p>
+              <a:rPr lang="en-US" sz="2400" b="1" dirty="0" smtClean="0">
+                <a:cs typeface="Andalus" panose="02020603050405020304" pitchFamily="18" charset="-78"/>
+              </a:rPr>
+              <a:t>Enrolled </a:t>
+            </a:r>
+            <a:r>
+              <a:rPr lang="en-US" sz="2400" b="1" dirty="0">
+                <a:cs typeface="Andalus" panose="02020603050405020304" pitchFamily="18" charset="-78"/>
+              </a:rPr>
+              <a:t>in Graduate Certificate Program in Software Design and Development (UW</a:t>
+            </a:r>
+            <a:r>
+              <a:rPr lang="en-US" sz="2400" b="1" dirty="0" smtClean="0">
+                <a:cs typeface="Andalus" panose="02020603050405020304" pitchFamily="18" charset="-78"/>
+              </a:rPr>
+              <a:t>) – is a goal to get Master’s degree in SE in the future</a:t>
+            </a:r>
+          </a:p>
+          <a:p>
+            <a:pPr marL="342900" indent="-342900">
+              <a:spcBef>
+                <a:spcPts val="1800"/>
+              </a:spcBef>
+              <a:buFont typeface="Arial" panose="020B0604020202020204" pitchFamily="34" charset="0"/>
+              <a:buChar char="•"/>
+            </a:pPr>
+            <a:r>
+              <a:rPr lang="en-US" sz="2400" b="1" dirty="0"/>
+              <a:t>Excited about opportunities to grow and learn new </a:t>
+            </a:r>
+            <a:r>
+              <a:rPr lang="en-US" sz="2400" b="1" dirty="0" smtClean="0"/>
+              <a:t>skills</a:t>
+            </a:r>
             <a:endParaRPr lang="en-US" sz="2400" b="1" dirty="0" smtClean="0"/>
           </a:p>
         </p:txBody>
@@ -12174,6 +12483,87 @@
                       </p:childTnLst>
                     </p:cTn>
                   </p:par>
+                  <p:par>
+                    <p:cTn id="18" fill="hold">
+                      <p:stCondLst>
+                        <p:cond delay="indefinite"/>
+                      </p:stCondLst>
+                      <p:childTnLst>
+                        <p:par>
+                          <p:cTn id="19" fill="hold">
+                            <p:stCondLst>
+                              <p:cond delay="0"/>
+                            </p:stCondLst>
+                            <p:childTnLst>
+                              <p:par>
+                                <p:cTn id="20" presetID="22" presetClass="entr" presetSubtype="8" fill="hold" nodeType="clickEffect">
+                                  <p:stCondLst>
+                                    <p:cond delay="0"/>
+                                  </p:stCondLst>
+                                  <p:childTnLst>
+                                    <p:set>
+                                      <p:cBhvr>
+                                        <p:cTn id="21" dur="1" fill="hold">
+                                          <p:stCondLst>
+                                            <p:cond delay="0"/>
+                                          </p:stCondLst>
+                                        </p:cTn>
+                                        <p:tgtEl>
+                                          <p:spTgt spid="12">
+                                            <p:txEl>
+                                              <p:pRg st="3" end="3"/>
+                                            </p:txEl>
+                                          </p:spTgt>
+                                        </p:tgtEl>
+                                        <p:attrNameLst>
+                                          <p:attrName>style.visibility</p:attrName>
+                                        </p:attrNameLst>
+                                      </p:cBhvr>
+                                      <p:to>
+                                        <p:strVal val="visible"/>
+                                      </p:to>
+                                    </p:set>
+                                    <p:animEffect transition="in" filter="wipe(left)">
+                                      <p:cBhvr>
+                                        <p:cTn id="22" dur="500"/>
+                                        <p:tgtEl>
+                                          <p:spTgt spid="12">
+                                            <p:txEl>
+                                              <p:pRg st="3" end="3"/>
+                                            </p:txEl>
+                                          </p:spTgt>
+                                        </p:tgtEl>
+                                      </p:cBhvr>
+                                    </p:animEffect>
+                                  </p:childTnLst>
+                                  <p:subTnLst>
+                                    <p:animClr clrSpc="rgb" dir="cw">
+                                      <p:cBhvr override="childStyle">
+                                        <p:cTn dur="1" fill="hold" display="0" masterRel="nextClick" afterEffect="1"/>
+                                        <p:tgtEl>
+                                          <p:spTgt spid="12">
+                                            <p:txEl>
+                                              <p:pRg st="3" end="3"/>
+                                            </p:txEl>
+                                          </p:spTgt>
+                                        </p:tgtEl>
+                                        <p:attrNameLst>
+                                          <p:attrName>ppt_c</p:attrName>
+                                        </p:attrNameLst>
+                                      </p:cBhvr>
+                                      <p:to>
+                                        <a:schemeClr val="accent1"/>
+                                      </p:to>
+                                    </p:animClr>
+                                  </p:subTnLst>
+                                </p:cTn>
+                              </p:par>
+                            </p:childTnLst>
+                          </p:cTn>
+                        </p:par>
+                      </p:childTnLst>
+                    </p:cTn>
+                  </p:par>
                 </p:childTnLst>
               </p:cTn>
               <p:prevCondLst>
@@ -12229,7 +12619,7 @@
           <p:cNvPr id="6" name="Picture 5">
             <a:extLst>
               <a:ext uri="{C183D7F6-B498-43B3-948B-1728B52AA6E4}">
-                <adec:decorative xmlns:adec="http://schemas.microsoft.com/office/drawing/2017/decorative" xmlns="" val="1"/>
+                <adec:decorative xmlns="" xmlns:adec="http://schemas.microsoft.com/office/drawing/2017/decorative" val="1"/>
               </a:ext>
             </a:extLst>
           </p:cNvPr>
@@ -12318,7 +12708,7 @@
           <p:cNvPr id="5" name="Rectangle 4">
             <a:extLst>
               <a:ext uri="{C183D7F6-B498-43B3-948B-1728B52AA6E4}">
-                <adec:decorative xmlns:adec="http://schemas.microsoft.com/office/drawing/2017/decorative" xmlns="" val="1"/>
+                <adec:decorative xmlns="" xmlns:adec="http://schemas.microsoft.com/office/drawing/2017/decorative" val="1"/>
               </a:ext>
             </a:extLst>
           </p:cNvPr>
@@ -12384,7 +12774,7 @@
           <p:cNvPr id="2" name="Title 1" hidden="1">
             <a:extLst>
               <a:ext uri="{FF2B5EF4-FFF2-40B4-BE49-F238E27FC236}">
-                <a16:creationId xmlns:a16="http://schemas.microsoft.com/office/drawing/2014/main" xmlns="" id="{10E603A3-B905-4FE4-AF3D-7ABD07598BAD}"/>
+                <a16:creationId xmlns="" xmlns:a16="http://schemas.microsoft.com/office/drawing/2014/main" id="{10E603A3-B905-4FE4-AF3D-7ABD07598BAD}"/>
               </a:ext>
             </a:extLst>
           </p:cNvPr>

</xml_diff>